<commit_message>
Prototype op basis van schermen v2
</commit_message>
<xml_diff>
--- a/Documentatie/Scherm verloop.pptx
+++ b/Documentatie/Scherm verloop.pptx
@@ -111,6 +111,11 @@
       </a:defRPr>
     </a:lvl9pPr>
   </p:defaultTextStyle>
+  <p:extLst>
+    <p:ext uri="{EFAFB233-063F-42B5-8137-9DF3F51BA10A}">
+      <p15:sldGuideLst xmlns:p15="http://schemas.microsoft.com/office/powerpoint/2012/main"/>
+    </p:ext>
+  </p:extLst>
 </p:presentation>
 </file>
 
@@ -245,7 +250,7 @@
           <a:p>
             <a:fld id="{707D8E1F-54A4-467F-82F8-ADAEC6652C21}" type="datetimeFigureOut">
               <a:rPr lang="nl-NL" smtClean="0"/>
-              <a:t>12-5-2014</a:t>
+              <a:t>13-5-2014</a:t>
             </a:fld>
             <a:endParaRPr lang="nl-NL"/>
           </a:p>
@@ -415,7 +420,7 @@
           <a:p>
             <a:fld id="{707D8E1F-54A4-467F-82F8-ADAEC6652C21}" type="datetimeFigureOut">
               <a:rPr lang="nl-NL" smtClean="0"/>
-              <a:t>12-5-2014</a:t>
+              <a:t>13-5-2014</a:t>
             </a:fld>
             <a:endParaRPr lang="nl-NL"/>
           </a:p>
@@ -595,7 +600,7 @@
           <a:p>
             <a:fld id="{707D8E1F-54A4-467F-82F8-ADAEC6652C21}" type="datetimeFigureOut">
               <a:rPr lang="nl-NL" smtClean="0"/>
-              <a:t>12-5-2014</a:t>
+              <a:t>13-5-2014</a:t>
             </a:fld>
             <a:endParaRPr lang="nl-NL"/>
           </a:p>
@@ -765,7 +770,7 @@
           <a:p>
             <a:fld id="{707D8E1F-54A4-467F-82F8-ADAEC6652C21}" type="datetimeFigureOut">
               <a:rPr lang="nl-NL" smtClean="0"/>
-              <a:t>12-5-2014</a:t>
+              <a:t>13-5-2014</a:t>
             </a:fld>
             <a:endParaRPr lang="nl-NL"/>
           </a:p>
@@ -1011,7 +1016,7 @@
           <a:p>
             <a:fld id="{707D8E1F-54A4-467F-82F8-ADAEC6652C21}" type="datetimeFigureOut">
               <a:rPr lang="nl-NL" smtClean="0"/>
-              <a:t>12-5-2014</a:t>
+              <a:t>13-5-2014</a:t>
             </a:fld>
             <a:endParaRPr lang="nl-NL"/>
           </a:p>
@@ -1243,7 +1248,7 @@
           <a:p>
             <a:fld id="{707D8E1F-54A4-467F-82F8-ADAEC6652C21}" type="datetimeFigureOut">
               <a:rPr lang="nl-NL" smtClean="0"/>
-              <a:t>12-5-2014</a:t>
+              <a:t>13-5-2014</a:t>
             </a:fld>
             <a:endParaRPr lang="nl-NL"/>
           </a:p>
@@ -1610,7 +1615,7 @@
           <a:p>
             <a:fld id="{707D8E1F-54A4-467F-82F8-ADAEC6652C21}" type="datetimeFigureOut">
               <a:rPr lang="nl-NL" smtClean="0"/>
-              <a:t>12-5-2014</a:t>
+              <a:t>13-5-2014</a:t>
             </a:fld>
             <a:endParaRPr lang="nl-NL"/>
           </a:p>
@@ -1728,7 +1733,7 @@
           <a:p>
             <a:fld id="{707D8E1F-54A4-467F-82F8-ADAEC6652C21}" type="datetimeFigureOut">
               <a:rPr lang="nl-NL" smtClean="0"/>
-              <a:t>12-5-2014</a:t>
+              <a:t>13-5-2014</a:t>
             </a:fld>
             <a:endParaRPr lang="nl-NL"/>
           </a:p>
@@ -1823,7 +1828,7 @@
           <a:p>
             <a:fld id="{707D8E1F-54A4-467F-82F8-ADAEC6652C21}" type="datetimeFigureOut">
               <a:rPr lang="nl-NL" smtClean="0"/>
-              <a:t>12-5-2014</a:t>
+              <a:t>13-5-2014</a:t>
             </a:fld>
             <a:endParaRPr lang="nl-NL"/>
           </a:p>
@@ -2100,7 +2105,7 @@
           <a:p>
             <a:fld id="{707D8E1F-54A4-467F-82F8-ADAEC6652C21}" type="datetimeFigureOut">
               <a:rPr lang="nl-NL" smtClean="0"/>
-              <a:t>12-5-2014</a:t>
+              <a:t>13-5-2014</a:t>
             </a:fld>
             <a:endParaRPr lang="nl-NL"/>
           </a:p>
@@ -2353,7 +2358,7 @@
           <a:p>
             <a:fld id="{707D8E1F-54A4-467F-82F8-ADAEC6652C21}" type="datetimeFigureOut">
               <a:rPr lang="nl-NL" smtClean="0"/>
-              <a:t>12-5-2014</a:t>
+              <a:t>13-5-2014</a:t>
             </a:fld>
             <a:endParaRPr lang="nl-NL"/>
           </a:p>
@@ -2566,7 +2571,7 @@
           <a:p>
             <a:fld id="{707D8E1F-54A4-467F-82F8-ADAEC6652C21}" type="datetimeFigureOut">
               <a:rPr lang="nl-NL" smtClean="0"/>
-              <a:t>12-5-2014</a:t>
+              <a:t>13-5-2014</a:t>
             </a:fld>
             <a:endParaRPr lang="nl-NL"/>
           </a:p>
@@ -3219,8 +3224,8 @@
         </p:nvSpPr>
         <p:spPr>
           <a:xfrm>
-            <a:off x="1058560" y="1129291"/>
-            <a:ext cx="2071818" cy="395416"/>
+            <a:off x="992658" y="2751438"/>
+            <a:ext cx="2071818" cy="586069"/>
           </a:xfrm>
           <a:prstGeom prst="actionButtonBlank">
             <a:avLst/>
@@ -3247,15 +3252,15 @@
             <a:pPr algn="ctr"/>
             <a:r>
               <a:rPr lang="nl-NL" dirty="0" smtClean="0"/>
-              <a:t>Poule fase</a:t>
-            </a:r>
-            <a:endParaRPr lang="nl-NL" dirty="0"/>
-          </a:p>
-        </p:txBody>
-      </p:sp>
-      <p:sp>
-        <p:nvSpPr>
-          <p:cNvPr id="5" name="Actieknop: Aangepast 4">
+              <a:t>Wedden</a:t>
+            </a:r>
+            <a:endParaRPr lang="nl-NL" dirty="0"/>
+          </a:p>
+        </p:txBody>
+      </p:sp>
+      <p:sp>
+        <p:nvSpPr>
+          <p:cNvPr id="6" name="Actieknop: Aangepast 5">
             <a:hlinkClick r:id="rId2" action="ppaction://hlinksldjump" highlightClick="1"/>
           </p:cNvPr>
           <p:cNvSpPr/>
@@ -3263,8 +3268,8 @@
         </p:nvSpPr>
         <p:spPr>
           <a:xfrm>
-            <a:off x="1058558" y="4100799"/>
-            <a:ext cx="2071820" cy="395416"/>
+            <a:off x="992656" y="1475758"/>
+            <a:ext cx="2071820" cy="550749"/>
           </a:xfrm>
           <a:prstGeom prst="actionButtonBlank">
             <a:avLst/>
@@ -3291,15 +3296,15 @@
             <a:pPr algn="ctr"/>
             <a:r>
               <a:rPr lang="nl-NL" dirty="0" smtClean="0"/>
-              <a:t>Finale</a:t>
-            </a:r>
-            <a:endParaRPr lang="nl-NL" dirty="0"/>
-          </a:p>
-        </p:txBody>
-      </p:sp>
-      <p:sp>
-        <p:nvSpPr>
-          <p:cNvPr id="6" name="Actieknop: Aangepast 5">
+              <a:t>Eigen Punten scherm</a:t>
+            </a:r>
+            <a:endParaRPr lang="nl-NL" dirty="0"/>
+          </a:p>
+        </p:txBody>
+      </p:sp>
+      <p:sp>
+        <p:nvSpPr>
+          <p:cNvPr id="7" name="Actieknop: Aangepast 6">
             <a:hlinkClick r:id="rId3" action="ppaction://hlinksldjump" highlightClick="1"/>
           </p:cNvPr>
           <p:cNvSpPr/>
@@ -3307,51 +3312,7 @@
         </p:nvSpPr>
         <p:spPr>
           <a:xfrm>
-            <a:off x="5029196" y="1632277"/>
-            <a:ext cx="2071820" cy="550749"/>
-          </a:xfrm>
-          <a:prstGeom prst="actionButtonBlank">
-            <a:avLst/>
-          </a:prstGeom>
-        </p:spPr>
-        <p:style>
-          <a:lnRef idx="2">
-            <a:schemeClr val="dk1"/>
-          </a:lnRef>
-          <a:fillRef idx="1">
-            <a:schemeClr val="lt1"/>
-          </a:fillRef>
-          <a:effectRef idx="0">
-            <a:schemeClr val="dk1"/>
-          </a:effectRef>
-          <a:fontRef idx="minor">
-            <a:schemeClr val="dk1"/>
-          </a:fontRef>
-        </p:style>
-        <p:txBody>
-          <a:bodyPr rtlCol="0" anchor="ctr"/>
-          <a:lstStyle/>
-          <a:p>
-            <a:pPr algn="ctr"/>
-            <a:r>
-              <a:rPr lang="nl-NL" dirty="0" smtClean="0"/>
-              <a:t>Eigen Punten scherm</a:t>
-            </a:r>
-            <a:endParaRPr lang="nl-NL" dirty="0"/>
-          </a:p>
-        </p:txBody>
-      </p:sp>
-      <p:sp>
-        <p:nvSpPr>
-          <p:cNvPr id="7" name="Actieknop: Aangepast 6">
-            <a:hlinkClick r:id="rId4" action="ppaction://hlinksldjump" highlightClick="1"/>
-          </p:cNvPr>
-          <p:cNvSpPr/>
-          <p:nvPr/>
-        </p:nvSpPr>
-        <p:spPr>
-          <a:xfrm>
-            <a:off x="5029196" y="3495213"/>
+            <a:off x="5029198" y="1475758"/>
             <a:ext cx="2071820" cy="605586"/>
           </a:xfrm>
           <a:prstGeom prst="actionButtonBlank">
@@ -3380,94 +3341,6 @@
             <a:r>
               <a:rPr lang="nl-NL" dirty="0" smtClean="0"/>
               <a:t>Algemeen punten scherm</a:t>
-            </a:r>
-            <a:endParaRPr lang="nl-NL" dirty="0"/>
-          </a:p>
-        </p:txBody>
-      </p:sp>
-      <p:sp>
-        <p:nvSpPr>
-          <p:cNvPr id="8" name="Actieknop: Aangepast 7">
-            <a:hlinkClick r:id="rId5" action="ppaction://hlinksldjump" highlightClick="1"/>
-          </p:cNvPr>
-          <p:cNvSpPr/>
-          <p:nvPr/>
-        </p:nvSpPr>
-        <p:spPr>
-          <a:xfrm>
-            <a:off x="1058559" y="3052949"/>
-            <a:ext cx="2071819" cy="395416"/>
-          </a:xfrm>
-          <a:prstGeom prst="actionButtonBlank">
-            <a:avLst/>
-          </a:prstGeom>
-        </p:spPr>
-        <p:style>
-          <a:lnRef idx="2">
-            <a:schemeClr val="dk1"/>
-          </a:lnRef>
-          <a:fillRef idx="1">
-            <a:schemeClr val="lt1"/>
-          </a:fillRef>
-          <a:effectRef idx="0">
-            <a:schemeClr val="dk1"/>
-          </a:effectRef>
-          <a:fontRef idx="minor">
-            <a:schemeClr val="dk1"/>
-          </a:fontRef>
-        </p:style>
-        <p:txBody>
-          <a:bodyPr rtlCol="0" anchor="ctr"/>
-          <a:lstStyle/>
-          <a:p>
-            <a:pPr algn="ctr"/>
-            <a:r>
-              <a:rPr lang="nl-NL" dirty="0" smtClean="0"/>
-              <a:t>Halve finale</a:t>
-            </a:r>
-            <a:endParaRPr lang="nl-NL" dirty="0"/>
-          </a:p>
-        </p:txBody>
-      </p:sp>
-      <p:sp>
-        <p:nvSpPr>
-          <p:cNvPr id="9" name="Actieknop: Aangepast 8">
-            <a:hlinkClick r:id="rId6" action="ppaction://hlinksldjump" highlightClick="1"/>
-          </p:cNvPr>
-          <p:cNvSpPr/>
-          <p:nvPr/>
-        </p:nvSpPr>
-        <p:spPr>
-          <a:xfrm>
-            <a:off x="1058560" y="2091120"/>
-            <a:ext cx="2071818" cy="395416"/>
-          </a:xfrm>
-          <a:prstGeom prst="actionButtonBlank">
-            <a:avLst/>
-          </a:prstGeom>
-        </p:spPr>
-        <p:style>
-          <a:lnRef idx="2">
-            <a:schemeClr val="dk1"/>
-          </a:lnRef>
-          <a:fillRef idx="1">
-            <a:schemeClr val="lt1"/>
-          </a:fillRef>
-          <a:effectRef idx="0">
-            <a:schemeClr val="dk1"/>
-          </a:effectRef>
-          <a:fontRef idx="minor">
-            <a:schemeClr val="dk1"/>
-          </a:fontRef>
-        </p:style>
-        <p:txBody>
-          <a:bodyPr rtlCol="0" anchor="ctr"/>
-          <a:lstStyle/>
-          <a:p>
-            <a:pPr algn="ctr"/>
-            <a:r>
-              <a:rPr lang="nl-NL" dirty="0" smtClean="0"/>
-              <a:t>Kwart finale</a:t>
             </a:r>
             <a:endParaRPr lang="nl-NL" dirty="0"/>
           </a:p>
@@ -3483,7 +3356,7 @@
         </p:nvSpPr>
         <p:spPr>
           <a:xfrm>
-            <a:off x="5029198" y="4496215"/>
+            <a:off x="5029198" y="2893956"/>
             <a:ext cx="2071818" cy="395416"/>
           </a:xfrm>
           <a:prstGeom prst="actionButtonBlank">
@@ -10811,7 +10684,7 @@
             </a:r>
             <a:r>
               <a:rPr lang="nl-NL" sz="1800" dirty="0" err="1" smtClean="0"/>
-              <a:t>overvieuw</a:t>
+              <a:t>overview</a:t>
             </a:r>
             <a:endParaRPr lang="nl-NL" sz="1800" dirty="0" smtClean="0"/>
           </a:p>

</xml_diff>

<commit_message>
plan van aanpak afgetend maar nu serieus
</commit_message>
<xml_diff>
--- a/Documentatie/Scherm verloop.pptx
+++ b/Documentatie/Scherm verloop.pptx
@@ -111,6 +111,11 @@
       </a:defRPr>
     </a:lvl9pPr>
   </p:defaultTextStyle>
+  <p:extLst>
+    <p:ext uri="{EFAFB233-063F-42B5-8137-9DF3F51BA10A}">
+      <p15:sldGuideLst xmlns:p15="http://schemas.microsoft.com/office/powerpoint/2012/main"/>
+    </p:ext>
+  </p:extLst>
 </p:presentation>
 </file>
 
@@ -245,7 +250,7 @@
           <a:p>
             <a:fld id="{707D8E1F-54A4-467F-82F8-ADAEC6652C21}" type="datetimeFigureOut">
               <a:rPr lang="nl-NL" smtClean="0"/>
-              <a:t>12-5-2014</a:t>
+              <a:t>13-5-2014</a:t>
             </a:fld>
             <a:endParaRPr lang="nl-NL"/>
           </a:p>
@@ -415,7 +420,7 @@
           <a:p>
             <a:fld id="{707D8E1F-54A4-467F-82F8-ADAEC6652C21}" type="datetimeFigureOut">
               <a:rPr lang="nl-NL" smtClean="0"/>
-              <a:t>12-5-2014</a:t>
+              <a:t>13-5-2014</a:t>
             </a:fld>
             <a:endParaRPr lang="nl-NL"/>
           </a:p>
@@ -595,7 +600,7 @@
           <a:p>
             <a:fld id="{707D8E1F-54A4-467F-82F8-ADAEC6652C21}" type="datetimeFigureOut">
               <a:rPr lang="nl-NL" smtClean="0"/>
-              <a:t>12-5-2014</a:t>
+              <a:t>13-5-2014</a:t>
             </a:fld>
             <a:endParaRPr lang="nl-NL"/>
           </a:p>
@@ -765,7 +770,7 @@
           <a:p>
             <a:fld id="{707D8E1F-54A4-467F-82F8-ADAEC6652C21}" type="datetimeFigureOut">
               <a:rPr lang="nl-NL" smtClean="0"/>
-              <a:t>12-5-2014</a:t>
+              <a:t>13-5-2014</a:t>
             </a:fld>
             <a:endParaRPr lang="nl-NL"/>
           </a:p>
@@ -1011,7 +1016,7 @@
           <a:p>
             <a:fld id="{707D8E1F-54A4-467F-82F8-ADAEC6652C21}" type="datetimeFigureOut">
               <a:rPr lang="nl-NL" smtClean="0"/>
-              <a:t>12-5-2014</a:t>
+              <a:t>13-5-2014</a:t>
             </a:fld>
             <a:endParaRPr lang="nl-NL"/>
           </a:p>
@@ -1243,7 +1248,7 @@
           <a:p>
             <a:fld id="{707D8E1F-54A4-467F-82F8-ADAEC6652C21}" type="datetimeFigureOut">
               <a:rPr lang="nl-NL" smtClean="0"/>
-              <a:t>12-5-2014</a:t>
+              <a:t>13-5-2014</a:t>
             </a:fld>
             <a:endParaRPr lang="nl-NL"/>
           </a:p>
@@ -1610,7 +1615,7 @@
           <a:p>
             <a:fld id="{707D8E1F-54A4-467F-82F8-ADAEC6652C21}" type="datetimeFigureOut">
               <a:rPr lang="nl-NL" smtClean="0"/>
-              <a:t>12-5-2014</a:t>
+              <a:t>13-5-2014</a:t>
             </a:fld>
             <a:endParaRPr lang="nl-NL"/>
           </a:p>
@@ -1728,7 +1733,7 @@
           <a:p>
             <a:fld id="{707D8E1F-54A4-467F-82F8-ADAEC6652C21}" type="datetimeFigureOut">
               <a:rPr lang="nl-NL" smtClean="0"/>
-              <a:t>12-5-2014</a:t>
+              <a:t>13-5-2014</a:t>
             </a:fld>
             <a:endParaRPr lang="nl-NL"/>
           </a:p>
@@ -1823,7 +1828,7 @@
           <a:p>
             <a:fld id="{707D8E1F-54A4-467F-82F8-ADAEC6652C21}" type="datetimeFigureOut">
               <a:rPr lang="nl-NL" smtClean="0"/>
-              <a:t>12-5-2014</a:t>
+              <a:t>13-5-2014</a:t>
             </a:fld>
             <a:endParaRPr lang="nl-NL"/>
           </a:p>
@@ -2100,7 +2105,7 @@
           <a:p>
             <a:fld id="{707D8E1F-54A4-467F-82F8-ADAEC6652C21}" type="datetimeFigureOut">
               <a:rPr lang="nl-NL" smtClean="0"/>
-              <a:t>12-5-2014</a:t>
+              <a:t>13-5-2014</a:t>
             </a:fld>
             <a:endParaRPr lang="nl-NL"/>
           </a:p>
@@ -2353,7 +2358,7 @@
           <a:p>
             <a:fld id="{707D8E1F-54A4-467F-82F8-ADAEC6652C21}" type="datetimeFigureOut">
               <a:rPr lang="nl-NL" smtClean="0"/>
-              <a:t>12-5-2014</a:t>
+              <a:t>13-5-2014</a:t>
             </a:fld>
             <a:endParaRPr lang="nl-NL"/>
           </a:p>
@@ -2566,7 +2571,7 @@
           <a:p>
             <a:fld id="{707D8E1F-54A4-467F-82F8-ADAEC6652C21}" type="datetimeFigureOut">
               <a:rPr lang="nl-NL" smtClean="0"/>
-              <a:t>12-5-2014</a:t>
+              <a:t>13-5-2014</a:t>
             </a:fld>
             <a:endParaRPr lang="nl-NL"/>
           </a:p>
@@ -3219,8 +3224,8 @@
         </p:nvSpPr>
         <p:spPr>
           <a:xfrm>
-            <a:off x="1058560" y="1129291"/>
-            <a:ext cx="2071818" cy="395416"/>
+            <a:off x="992658" y="2751438"/>
+            <a:ext cx="2071818" cy="586069"/>
           </a:xfrm>
           <a:prstGeom prst="actionButtonBlank">
             <a:avLst/>
@@ -3247,15 +3252,15 @@
             <a:pPr algn="ctr"/>
             <a:r>
               <a:rPr lang="nl-NL" dirty="0" smtClean="0"/>
-              <a:t>Poule fase</a:t>
-            </a:r>
-            <a:endParaRPr lang="nl-NL" dirty="0"/>
-          </a:p>
-        </p:txBody>
-      </p:sp>
-      <p:sp>
-        <p:nvSpPr>
-          <p:cNvPr id="5" name="Actieknop: Aangepast 4">
+              <a:t>Wedden</a:t>
+            </a:r>
+            <a:endParaRPr lang="nl-NL" dirty="0"/>
+          </a:p>
+        </p:txBody>
+      </p:sp>
+      <p:sp>
+        <p:nvSpPr>
+          <p:cNvPr id="6" name="Actieknop: Aangepast 5">
             <a:hlinkClick r:id="rId2" action="ppaction://hlinksldjump" highlightClick="1"/>
           </p:cNvPr>
           <p:cNvSpPr/>
@@ -3263,8 +3268,8 @@
         </p:nvSpPr>
         <p:spPr>
           <a:xfrm>
-            <a:off x="1058558" y="4100799"/>
-            <a:ext cx="2071820" cy="395416"/>
+            <a:off x="992656" y="1475758"/>
+            <a:ext cx="2071820" cy="550749"/>
           </a:xfrm>
           <a:prstGeom prst="actionButtonBlank">
             <a:avLst/>
@@ -3291,15 +3296,15 @@
             <a:pPr algn="ctr"/>
             <a:r>
               <a:rPr lang="nl-NL" dirty="0" smtClean="0"/>
-              <a:t>Finale</a:t>
-            </a:r>
-            <a:endParaRPr lang="nl-NL" dirty="0"/>
-          </a:p>
-        </p:txBody>
-      </p:sp>
-      <p:sp>
-        <p:nvSpPr>
-          <p:cNvPr id="6" name="Actieknop: Aangepast 5">
+              <a:t>Eigen Punten scherm</a:t>
+            </a:r>
+            <a:endParaRPr lang="nl-NL" dirty="0"/>
+          </a:p>
+        </p:txBody>
+      </p:sp>
+      <p:sp>
+        <p:nvSpPr>
+          <p:cNvPr id="7" name="Actieknop: Aangepast 6">
             <a:hlinkClick r:id="rId3" action="ppaction://hlinksldjump" highlightClick="1"/>
           </p:cNvPr>
           <p:cNvSpPr/>
@@ -3307,51 +3312,7 @@
         </p:nvSpPr>
         <p:spPr>
           <a:xfrm>
-            <a:off x="5029196" y="1632277"/>
-            <a:ext cx="2071820" cy="550749"/>
-          </a:xfrm>
-          <a:prstGeom prst="actionButtonBlank">
-            <a:avLst/>
-          </a:prstGeom>
-        </p:spPr>
-        <p:style>
-          <a:lnRef idx="2">
-            <a:schemeClr val="dk1"/>
-          </a:lnRef>
-          <a:fillRef idx="1">
-            <a:schemeClr val="lt1"/>
-          </a:fillRef>
-          <a:effectRef idx="0">
-            <a:schemeClr val="dk1"/>
-          </a:effectRef>
-          <a:fontRef idx="minor">
-            <a:schemeClr val="dk1"/>
-          </a:fontRef>
-        </p:style>
-        <p:txBody>
-          <a:bodyPr rtlCol="0" anchor="ctr"/>
-          <a:lstStyle/>
-          <a:p>
-            <a:pPr algn="ctr"/>
-            <a:r>
-              <a:rPr lang="nl-NL" dirty="0" smtClean="0"/>
-              <a:t>Eigen Punten scherm</a:t>
-            </a:r>
-            <a:endParaRPr lang="nl-NL" dirty="0"/>
-          </a:p>
-        </p:txBody>
-      </p:sp>
-      <p:sp>
-        <p:nvSpPr>
-          <p:cNvPr id="7" name="Actieknop: Aangepast 6">
-            <a:hlinkClick r:id="rId4" action="ppaction://hlinksldjump" highlightClick="1"/>
-          </p:cNvPr>
-          <p:cNvSpPr/>
-          <p:nvPr/>
-        </p:nvSpPr>
-        <p:spPr>
-          <a:xfrm>
-            <a:off x="5029196" y="3495213"/>
+            <a:off x="5029198" y="1475758"/>
             <a:ext cx="2071820" cy="605586"/>
           </a:xfrm>
           <a:prstGeom prst="actionButtonBlank">
@@ -3380,94 +3341,6 @@
             <a:r>
               <a:rPr lang="nl-NL" dirty="0" smtClean="0"/>
               <a:t>Algemeen punten scherm</a:t>
-            </a:r>
-            <a:endParaRPr lang="nl-NL" dirty="0"/>
-          </a:p>
-        </p:txBody>
-      </p:sp>
-      <p:sp>
-        <p:nvSpPr>
-          <p:cNvPr id="8" name="Actieknop: Aangepast 7">
-            <a:hlinkClick r:id="rId5" action="ppaction://hlinksldjump" highlightClick="1"/>
-          </p:cNvPr>
-          <p:cNvSpPr/>
-          <p:nvPr/>
-        </p:nvSpPr>
-        <p:spPr>
-          <a:xfrm>
-            <a:off x="1058559" y="3052949"/>
-            <a:ext cx="2071819" cy="395416"/>
-          </a:xfrm>
-          <a:prstGeom prst="actionButtonBlank">
-            <a:avLst/>
-          </a:prstGeom>
-        </p:spPr>
-        <p:style>
-          <a:lnRef idx="2">
-            <a:schemeClr val="dk1"/>
-          </a:lnRef>
-          <a:fillRef idx="1">
-            <a:schemeClr val="lt1"/>
-          </a:fillRef>
-          <a:effectRef idx="0">
-            <a:schemeClr val="dk1"/>
-          </a:effectRef>
-          <a:fontRef idx="minor">
-            <a:schemeClr val="dk1"/>
-          </a:fontRef>
-        </p:style>
-        <p:txBody>
-          <a:bodyPr rtlCol="0" anchor="ctr"/>
-          <a:lstStyle/>
-          <a:p>
-            <a:pPr algn="ctr"/>
-            <a:r>
-              <a:rPr lang="nl-NL" dirty="0" smtClean="0"/>
-              <a:t>Halve finale</a:t>
-            </a:r>
-            <a:endParaRPr lang="nl-NL" dirty="0"/>
-          </a:p>
-        </p:txBody>
-      </p:sp>
-      <p:sp>
-        <p:nvSpPr>
-          <p:cNvPr id="9" name="Actieknop: Aangepast 8">
-            <a:hlinkClick r:id="rId6" action="ppaction://hlinksldjump" highlightClick="1"/>
-          </p:cNvPr>
-          <p:cNvSpPr/>
-          <p:nvPr/>
-        </p:nvSpPr>
-        <p:spPr>
-          <a:xfrm>
-            <a:off x="1058560" y="2091120"/>
-            <a:ext cx="2071818" cy="395416"/>
-          </a:xfrm>
-          <a:prstGeom prst="actionButtonBlank">
-            <a:avLst/>
-          </a:prstGeom>
-        </p:spPr>
-        <p:style>
-          <a:lnRef idx="2">
-            <a:schemeClr val="dk1"/>
-          </a:lnRef>
-          <a:fillRef idx="1">
-            <a:schemeClr val="lt1"/>
-          </a:fillRef>
-          <a:effectRef idx="0">
-            <a:schemeClr val="dk1"/>
-          </a:effectRef>
-          <a:fontRef idx="minor">
-            <a:schemeClr val="dk1"/>
-          </a:fontRef>
-        </p:style>
-        <p:txBody>
-          <a:bodyPr rtlCol="0" anchor="ctr"/>
-          <a:lstStyle/>
-          <a:p>
-            <a:pPr algn="ctr"/>
-            <a:r>
-              <a:rPr lang="nl-NL" dirty="0" smtClean="0"/>
-              <a:t>Kwart finale</a:t>
             </a:r>
             <a:endParaRPr lang="nl-NL" dirty="0"/>
           </a:p>
@@ -3483,7 +3356,7 @@
         </p:nvSpPr>
         <p:spPr>
           <a:xfrm>
-            <a:off x="5029198" y="4496215"/>
+            <a:off x="5029198" y="2893956"/>
             <a:ext cx="2071818" cy="395416"/>
           </a:xfrm>
           <a:prstGeom prst="actionButtonBlank">
@@ -10811,7 +10684,7 @@
             </a:r>
             <a:r>
               <a:rPr lang="nl-NL" sz="1800" dirty="0" err="1" smtClean="0"/>
-              <a:t>overvieuw</a:t>
+              <a:t>overview</a:t>
             </a:r>
             <a:endParaRPr lang="nl-NL" sz="1800" dirty="0" smtClean="0"/>
           </a:p>

</xml_diff>